<commit_message>
10.02 Final Edit ppt
</commit_message>
<xml_diff>
--- a/ETC/프로젝트 제안서 7조.pptx
+++ b/ETC/프로젝트 제안서 7조.pptx
@@ -6061,7 +6061,7 @@
                 <a:latin typeface="a천생연분" panose="02020600000000000000" pitchFamily="18" charset="-127"/>
                 <a:ea typeface="a천생연분" panose="02020600000000000000" pitchFamily="18" charset="-127"/>
               </a:rPr>
-              <a:t>SOLUTION?</a:t>
+              <a:t>SOLUTION</a:t>
             </a:r>
           </a:p>
           <a:p>
@@ -6177,7 +6177,7 @@
                 <a:latin typeface="a천생연분" panose="02020600000000000000" pitchFamily="18" charset="-127"/>
                 <a:ea typeface="a천생연분" panose="02020600000000000000" pitchFamily="18" charset="-127"/>
               </a:rPr>
-              <a:t>SOLUTION?</a:t>
+              <a:t>SOLUTION</a:t>
             </a:r>
           </a:p>
           <a:p>
@@ -6488,7 +6488,12 @@
             <p:ph type="title"/>
           </p:nvPr>
         </p:nvSpPr>
-        <p:spPr/>
+        <p:spPr>
+          <a:xfrm>
+            <a:off x="838200" y="311962"/>
+            <a:ext cx="10515600" cy="1325563"/>
+          </a:xfrm>
+        </p:spPr>
         <p:txBody>
           <a:bodyPr/>
           <a:lstStyle/>
@@ -6500,6 +6505,214 @@
               </a:rPr>
               <a:t>비즈니스 목표</a:t>
             </a:r>
+          </a:p>
+        </p:txBody>
+      </p:sp>
+      <p:sp>
+        <p:nvSpPr>
+          <p:cNvPr id="3" name="내용 개체 틀 2">
+            <a:extLst>
+              <a:ext uri="{FF2B5EF4-FFF2-40B4-BE49-F238E27FC236}">
+                <a16:creationId xmlns:a16="http://schemas.microsoft.com/office/drawing/2014/main" id="{C23BE003-D31A-4234-8169-309CBE6342FA}"/>
+              </a:ext>
+            </a:extLst>
+          </p:cNvPr>
+          <p:cNvSpPr>
+            <a:spLocks noGrp="1"/>
+          </p:cNvSpPr>
+          <p:nvPr>
+            <p:ph sz="half" idx="1"/>
+          </p:nvPr>
+        </p:nvSpPr>
+        <p:spPr>
+          <a:xfrm>
+            <a:off x="795667" y="1857524"/>
+            <a:ext cx="10708759" cy="2096269"/>
+          </a:xfrm>
+        </p:spPr>
+        <p:txBody>
+          <a:bodyPr/>
+          <a:lstStyle/>
+          <a:p>
+            <a:pPr marL="0" indent="0">
+              <a:buNone/>
+            </a:pPr>
+            <a:r>
+              <a:rPr lang="ko-KR" altLang="en-US" u="sng" dirty="0">
+                <a:latin typeface="a천생연분" panose="02020600000000000000" pitchFamily="18" charset="-127"/>
+                <a:ea typeface="a천생연분" panose="02020600000000000000" pitchFamily="18" charset="-127"/>
+              </a:rPr>
+              <a:t>유통기한에 따른 식품 폐기 감소</a:t>
+            </a:r>
+            <a:endParaRPr lang="en-US" altLang="ko-KR" u="sng" dirty="0">
+              <a:latin typeface="a천생연분" panose="02020600000000000000" pitchFamily="18" charset="-127"/>
+              <a:ea typeface="a천생연분" panose="02020600000000000000" pitchFamily="18" charset="-127"/>
+            </a:endParaRPr>
+          </a:p>
+          <a:p>
+            <a:pPr marL="0" indent="0">
+              <a:buNone/>
+            </a:pPr>
+            <a:endParaRPr lang="en-US" altLang="ko-KR" sz="2400" dirty="0">
+              <a:latin typeface="a천생연분" panose="02020600000000000000" pitchFamily="18" charset="-127"/>
+              <a:ea typeface="a천생연분" panose="02020600000000000000" pitchFamily="18" charset="-127"/>
+            </a:endParaRPr>
+          </a:p>
+          <a:p>
+            <a:pPr marL="0" indent="0">
+              <a:buNone/>
+            </a:pPr>
+            <a:r>
+              <a:rPr lang="en-US" altLang="ko-KR" sz="2400" dirty="0">
+                <a:latin typeface="a천생연분" panose="02020600000000000000" pitchFamily="18" charset="-127"/>
+                <a:ea typeface="a천생연분" panose="02020600000000000000" pitchFamily="18" charset="-127"/>
+              </a:rPr>
+              <a:t>- ‘</a:t>
+            </a:r>
+            <a:r>
+              <a:rPr lang="ko-KR" altLang="en-US" sz="2400" dirty="0">
+                <a:latin typeface="a천생연분" panose="02020600000000000000" pitchFamily="18" charset="-127"/>
+                <a:ea typeface="a천생연분" panose="02020600000000000000" pitchFamily="18" charset="-127"/>
+              </a:rPr>
+              <a:t>유통기한이 지난 식품은 먹을 수 없다</a:t>
+            </a:r>
+            <a:r>
+              <a:rPr lang="en-US" altLang="ko-KR" sz="2400" dirty="0">
+                <a:latin typeface="a천생연분" panose="02020600000000000000" pitchFamily="18" charset="-127"/>
+                <a:ea typeface="a천생연분" panose="02020600000000000000" pitchFamily="18" charset="-127"/>
+              </a:rPr>
+              <a:t>’</a:t>
+            </a:r>
+            <a:r>
+              <a:rPr lang="ko-KR" altLang="en-US" sz="2400" dirty="0">
+                <a:latin typeface="a천생연분" panose="02020600000000000000" pitchFamily="18" charset="-127"/>
+                <a:ea typeface="a천생연분" panose="02020600000000000000" pitchFamily="18" charset="-127"/>
+              </a:rPr>
+              <a:t>는 인식때문에 음식물이 불필요하게 </a:t>
+            </a:r>
+            <a:r>
+              <a:rPr lang="ko-KR" altLang="en-US" sz="2400" dirty="0" err="1">
+                <a:latin typeface="a천생연분" panose="02020600000000000000" pitchFamily="18" charset="-127"/>
+                <a:ea typeface="a천생연분" panose="02020600000000000000" pitchFamily="18" charset="-127"/>
+              </a:rPr>
+              <a:t>버려짐</a:t>
+            </a:r>
+            <a:endParaRPr lang="en-US" altLang="ko-KR" sz="2400" dirty="0">
+              <a:latin typeface="a천생연분" panose="02020600000000000000" pitchFamily="18" charset="-127"/>
+              <a:ea typeface="a천생연분" panose="02020600000000000000" pitchFamily="18" charset="-127"/>
+            </a:endParaRPr>
+          </a:p>
+          <a:p>
+            <a:pPr marL="0" indent="0">
+              <a:buNone/>
+            </a:pPr>
+            <a:r>
+              <a:rPr lang="en-US" altLang="ko-KR" sz="2400" dirty="0">
+                <a:latin typeface="a천생연분" panose="02020600000000000000" pitchFamily="18" charset="-127"/>
+                <a:ea typeface="a천생연분" panose="02020600000000000000" pitchFamily="18" charset="-127"/>
+              </a:rPr>
+              <a:t>- ‘</a:t>
+            </a:r>
+            <a:r>
+              <a:rPr lang="ko-KR" altLang="en-US" sz="2400" dirty="0">
+                <a:latin typeface="a천생연분" panose="02020600000000000000" pitchFamily="18" charset="-127"/>
+                <a:ea typeface="a천생연분" panose="02020600000000000000" pitchFamily="18" charset="-127"/>
+              </a:rPr>
+              <a:t>언제까지 먹어도 괜찮다</a:t>
+            </a:r>
+            <a:r>
+              <a:rPr lang="en-US" altLang="ko-KR" sz="2400" dirty="0">
+                <a:latin typeface="a천생연분" panose="02020600000000000000" pitchFamily="18" charset="-127"/>
+                <a:ea typeface="a천생연분" panose="02020600000000000000" pitchFamily="18" charset="-127"/>
+              </a:rPr>
+              <a:t>＇</a:t>
+            </a:r>
+            <a:r>
+              <a:rPr lang="ko-KR" altLang="en-US" sz="2400" dirty="0">
+                <a:latin typeface="a천생연분" panose="02020600000000000000" pitchFamily="18" charset="-127"/>
+                <a:ea typeface="a천생연분" panose="02020600000000000000" pitchFamily="18" charset="-127"/>
+              </a:rPr>
+              <a:t>를 의미하는 소비기한 사용함으로써 식품 폐기물 감소</a:t>
+            </a:r>
+            <a:endParaRPr lang="en-US" altLang="ko-KR" sz="2400" dirty="0">
+              <a:latin typeface="a천생연분" panose="02020600000000000000" pitchFamily="18" charset="-127"/>
+              <a:ea typeface="a천생연분" panose="02020600000000000000" pitchFamily="18" charset="-127"/>
+            </a:endParaRPr>
+          </a:p>
+        </p:txBody>
+      </p:sp>
+      <p:sp>
+        <p:nvSpPr>
+          <p:cNvPr id="5" name="내용 개체 틀 4">
+            <a:extLst>
+              <a:ext uri="{FF2B5EF4-FFF2-40B4-BE49-F238E27FC236}">
+                <a16:creationId xmlns:a16="http://schemas.microsoft.com/office/drawing/2014/main" id="{5FC8BCD3-B007-4961-A37B-38F9A6DF2890}"/>
+              </a:ext>
+            </a:extLst>
+          </p:cNvPr>
+          <p:cNvSpPr>
+            <a:spLocks noGrp="1"/>
+          </p:cNvSpPr>
+          <p:nvPr>
+            <p:ph sz="half" idx="2"/>
+          </p:nvPr>
+        </p:nvSpPr>
+        <p:spPr>
+          <a:xfrm>
+            <a:off x="795666" y="4411888"/>
+            <a:ext cx="10708759" cy="1499192"/>
+          </a:xfrm>
+        </p:spPr>
+        <p:txBody>
+          <a:bodyPr/>
+          <a:lstStyle/>
+          <a:p>
+            <a:pPr marL="0" indent="0">
+              <a:buNone/>
+            </a:pPr>
+            <a:r>
+              <a:rPr lang="ko-KR" altLang="en-US" u="sng" dirty="0">
+                <a:latin typeface="a천생연분" panose="02020600000000000000" pitchFamily="18" charset="-127"/>
+                <a:ea typeface="a천생연분" panose="02020600000000000000" pitchFamily="18" charset="-127"/>
+              </a:rPr>
+              <a:t>불필요한 지출 최소화</a:t>
+            </a:r>
+            <a:endParaRPr lang="en-US" altLang="ko-KR" u="sng" dirty="0">
+              <a:latin typeface="a천생연분" panose="02020600000000000000" pitchFamily="18" charset="-127"/>
+              <a:ea typeface="a천생연분" panose="02020600000000000000" pitchFamily="18" charset="-127"/>
+            </a:endParaRPr>
+          </a:p>
+          <a:p>
+            <a:pPr marL="0" indent="0">
+              <a:buNone/>
+            </a:pPr>
+            <a:endParaRPr lang="en-US" altLang="ko-KR" sz="2400" dirty="0">
+              <a:latin typeface="a천생연분" panose="02020600000000000000" pitchFamily="18" charset="-127"/>
+              <a:ea typeface="a천생연분" panose="02020600000000000000" pitchFamily="18" charset="-127"/>
+            </a:endParaRPr>
+          </a:p>
+          <a:p>
+            <a:pPr marL="0" indent="0">
+              <a:buNone/>
+            </a:pPr>
+            <a:r>
+              <a:rPr lang="en-US" altLang="ko-KR" sz="2400" dirty="0">
+                <a:latin typeface="a천생연분" panose="02020600000000000000" pitchFamily="18" charset="-127"/>
+                <a:ea typeface="a천생연분" panose="02020600000000000000" pitchFamily="18" charset="-127"/>
+              </a:rPr>
+              <a:t>- </a:t>
+            </a:r>
+            <a:r>
+              <a:rPr lang="ko-KR" altLang="en-US" sz="2400" dirty="0">
+                <a:latin typeface="a천생연분" panose="02020600000000000000" pitchFamily="18" charset="-127"/>
+                <a:ea typeface="a천생연분" panose="02020600000000000000" pitchFamily="18" charset="-127"/>
+              </a:rPr>
+              <a:t>유통기한보다 더 긴 소비기한을 사용하여 식품을 좀 더 오래 보관하고 먹을 수 있음</a:t>
+            </a:r>
+            <a:endParaRPr lang="en-US" altLang="ko-KR" sz="2400" dirty="0">
+              <a:latin typeface="a천생연분" panose="02020600000000000000" pitchFamily="18" charset="-127"/>
+              <a:ea typeface="a천생연분" panose="02020600000000000000" pitchFamily="18" charset="-127"/>
+            </a:endParaRPr>
           </a:p>
         </p:txBody>
       </p:sp>
@@ -6699,61 +6912,6 @@
               <a:buFontTx/>
               <a:buChar char="-"/>
             </a:pPr>
-            <a:r>
-              <a:rPr lang="ko-KR" altLang="en-US" dirty="0">
-                <a:latin typeface="a천생연분" panose="02020600000000000000" pitchFamily="18" charset="-127"/>
-                <a:ea typeface="a천생연분" panose="02020600000000000000" pitchFamily="18" charset="-127"/>
-              </a:rPr>
-              <a:t> 유통기한에 따른 식품 폐기 감소</a:t>
-            </a:r>
-            <a:r>
-              <a:rPr lang="en-US" altLang="ko-KR" dirty="0">
-                <a:latin typeface="a천생연분" panose="02020600000000000000" pitchFamily="18" charset="-127"/>
-                <a:ea typeface="a천생연분" panose="02020600000000000000" pitchFamily="18" charset="-127"/>
-              </a:rPr>
-              <a:t>(</a:t>
-            </a:r>
-            <a:r>
-              <a:rPr lang="ko-KR" altLang="en-US" dirty="0">
-                <a:latin typeface="a천생연분" panose="02020600000000000000" pitchFamily="18" charset="-127"/>
-                <a:ea typeface="a천생연분" panose="02020600000000000000" pitchFamily="18" charset="-127"/>
-              </a:rPr>
-              <a:t>현재 연간 </a:t>
-            </a:r>
-            <a:r>
-              <a:rPr lang="en-US" altLang="ko-KR" dirty="0">
-                <a:latin typeface="a천생연분" panose="02020600000000000000" pitchFamily="18" charset="-127"/>
-                <a:ea typeface="a천생연분" panose="02020600000000000000" pitchFamily="18" charset="-127"/>
-              </a:rPr>
-              <a:t>1</a:t>
-            </a:r>
-            <a:r>
-              <a:rPr lang="ko-KR" altLang="en-US" dirty="0">
-                <a:latin typeface="a천생연분" panose="02020600000000000000" pitchFamily="18" charset="-127"/>
-                <a:ea typeface="a천생연분" panose="02020600000000000000" pitchFamily="18" charset="-127"/>
-              </a:rPr>
-              <a:t>조원의 손실 발생</a:t>
-            </a:r>
-            <a:r>
-              <a:rPr lang="en-US" altLang="ko-KR" dirty="0">
-                <a:latin typeface="a천생연분" panose="02020600000000000000" pitchFamily="18" charset="-127"/>
-                <a:ea typeface="a천생연분" panose="02020600000000000000" pitchFamily="18" charset="-127"/>
-              </a:rPr>
-              <a:t>)</a:t>
-            </a:r>
-          </a:p>
-          <a:p>
-            <a:pPr>
-              <a:buFontTx/>
-              <a:buChar char="-"/>
-            </a:pPr>
-            <a:r>
-              <a:rPr lang="ko-KR" altLang="en-US" dirty="0">
-                <a:latin typeface="a천생연분" panose="02020600000000000000" pitchFamily="18" charset="-127"/>
-                <a:ea typeface="a천생연분" panose="02020600000000000000" pitchFamily="18" charset="-127"/>
-              </a:rPr>
-              <a:t> 불필요한 지출 최소화</a:t>
-            </a:r>
             <a:endParaRPr lang="en-US" altLang="ko-KR" dirty="0">
               <a:latin typeface="a천생연분" panose="02020600000000000000" pitchFamily="18" charset="-127"/>
               <a:ea typeface="a천생연분" panose="02020600000000000000" pitchFamily="18" charset="-127"/>

</xml_diff>

<commit_message>
10.03 Final Edit pptx
</commit_message>
<xml_diff>
--- a/ETC/프로젝트 제안서 7조.pptx
+++ b/ETC/프로젝트 제안서 7조.pptx
@@ -208,7 +208,7 @@
           <a:p>
             <a:fld id="{09B75D47-7581-4EC6-9DBA-51A73CFF6B9C}" type="datetimeFigureOut">
               <a:rPr lang="ko-KR" altLang="en-US" smtClean="0"/>
-              <a:t>2021-10-02</a:t>
+              <a:t>2021-10-03</a:t>
             </a:fld>
             <a:endParaRPr lang="ko-KR" altLang="en-US"/>
           </a:p>
@@ -1133,7 +1133,7 @@
           <a:p>
             <a:fld id="{0C227048-AD30-4EB8-BFA5-CE5E90F25390}" type="datetimeFigureOut">
               <a:rPr lang="ko-KR" altLang="en-US" smtClean="0"/>
-              <a:t>2021-10-02</a:t>
+              <a:t>2021-10-03</a:t>
             </a:fld>
             <a:endParaRPr lang="ko-KR" altLang="en-US"/>
           </a:p>
@@ -1331,7 +1331,7 @@
           <a:p>
             <a:fld id="{0C227048-AD30-4EB8-BFA5-CE5E90F25390}" type="datetimeFigureOut">
               <a:rPr lang="ko-KR" altLang="en-US" smtClean="0"/>
-              <a:t>2021-10-02</a:t>
+              <a:t>2021-10-03</a:t>
             </a:fld>
             <a:endParaRPr lang="ko-KR" altLang="en-US"/>
           </a:p>
@@ -1539,7 +1539,7 @@
           <a:p>
             <a:fld id="{0C227048-AD30-4EB8-BFA5-CE5E90F25390}" type="datetimeFigureOut">
               <a:rPr lang="ko-KR" altLang="en-US" smtClean="0"/>
-              <a:t>2021-10-02</a:t>
+              <a:t>2021-10-03</a:t>
             </a:fld>
             <a:endParaRPr lang="ko-KR" altLang="en-US"/>
           </a:p>
@@ -1737,7 +1737,7 @@
           <a:p>
             <a:fld id="{0C227048-AD30-4EB8-BFA5-CE5E90F25390}" type="datetimeFigureOut">
               <a:rPr lang="ko-KR" altLang="en-US" smtClean="0"/>
-              <a:t>2021-10-02</a:t>
+              <a:t>2021-10-03</a:t>
             </a:fld>
             <a:endParaRPr lang="ko-KR" altLang="en-US"/>
           </a:p>
@@ -2012,7 +2012,7 @@
           <a:p>
             <a:fld id="{0C227048-AD30-4EB8-BFA5-CE5E90F25390}" type="datetimeFigureOut">
               <a:rPr lang="ko-KR" altLang="en-US" smtClean="0"/>
-              <a:t>2021-10-02</a:t>
+              <a:t>2021-10-03</a:t>
             </a:fld>
             <a:endParaRPr lang="ko-KR" altLang="en-US"/>
           </a:p>
@@ -2277,7 +2277,7 @@
           <a:p>
             <a:fld id="{0C227048-AD30-4EB8-BFA5-CE5E90F25390}" type="datetimeFigureOut">
               <a:rPr lang="ko-KR" altLang="en-US" smtClean="0"/>
-              <a:t>2021-10-02</a:t>
+              <a:t>2021-10-03</a:t>
             </a:fld>
             <a:endParaRPr lang="ko-KR" altLang="en-US"/>
           </a:p>
@@ -2689,7 +2689,7 @@
           <a:p>
             <a:fld id="{0C227048-AD30-4EB8-BFA5-CE5E90F25390}" type="datetimeFigureOut">
               <a:rPr lang="ko-KR" altLang="en-US" smtClean="0"/>
-              <a:t>2021-10-02</a:t>
+              <a:t>2021-10-03</a:t>
             </a:fld>
             <a:endParaRPr lang="ko-KR" altLang="en-US"/>
           </a:p>
@@ -2830,7 +2830,7 @@
           <a:p>
             <a:fld id="{0C227048-AD30-4EB8-BFA5-CE5E90F25390}" type="datetimeFigureOut">
               <a:rPr lang="ko-KR" altLang="en-US" smtClean="0"/>
-              <a:t>2021-10-02</a:t>
+              <a:t>2021-10-03</a:t>
             </a:fld>
             <a:endParaRPr lang="ko-KR" altLang="en-US"/>
           </a:p>
@@ -2943,7 +2943,7 @@
           <a:p>
             <a:fld id="{0C227048-AD30-4EB8-BFA5-CE5E90F25390}" type="datetimeFigureOut">
               <a:rPr lang="ko-KR" altLang="en-US" smtClean="0"/>
-              <a:t>2021-10-02</a:t>
+              <a:t>2021-10-03</a:t>
             </a:fld>
             <a:endParaRPr lang="ko-KR" altLang="en-US"/>
           </a:p>
@@ -3254,7 +3254,7 @@
           <a:p>
             <a:fld id="{0C227048-AD30-4EB8-BFA5-CE5E90F25390}" type="datetimeFigureOut">
               <a:rPr lang="ko-KR" altLang="en-US" smtClean="0"/>
-              <a:t>2021-10-02</a:t>
+              <a:t>2021-10-03</a:t>
             </a:fld>
             <a:endParaRPr lang="ko-KR" altLang="en-US"/>
           </a:p>
@@ -3542,7 +3542,7 @@
           <a:p>
             <a:fld id="{0C227048-AD30-4EB8-BFA5-CE5E90F25390}" type="datetimeFigureOut">
               <a:rPr lang="ko-KR" altLang="en-US" smtClean="0"/>
-              <a:t>2021-10-02</a:t>
+              <a:t>2021-10-03</a:t>
             </a:fld>
             <a:endParaRPr lang="ko-KR" altLang="en-US"/>
           </a:p>
@@ -3783,7 +3783,7 @@
           <a:p>
             <a:fld id="{0C227048-AD30-4EB8-BFA5-CE5E90F25390}" type="datetimeFigureOut">
               <a:rPr lang="ko-KR" altLang="en-US" smtClean="0"/>
-              <a:t>2021-10-02</a:t>
+              <a:t>2021-10-03</a:t>
             </a:fld>
             <a:endParaRPr lang="ko-KR" altLang="en-US"/>
           </a:p>
@@ -4289,11 +4289,18 @@
           <a:p>
             <a:pPr algn="r"/>
             <a:r>
+              <a:rPr lang="ko-KR" altLang="en-US" dirty="0" err="1">
+                <a:latin typeface="a천생연분" panose="02020600000000000000" pitchFamily="18" charset="-127"/>
+                <a:ea typeface="a천생연분" panose="02020600000000000000" pitchFamily="18" charset="-127"/>
+              </a:rPr>
+              <a:t>강한빛</a:t>
+            </a:r>
+            <a:r>
               <a:rPr lang="ko-KR" altLang="en-US" dirty="0">
                 <a:latin typeface="a천생연분" panose="02020600000000000000" pitchFamily="18" charset="-127"/>
                 <a:ea typeface="a천생연분" panose="02020600000000000000" pitchFamily="18" charset="-127"/>
               </a:rPr>
-              <a:t>강한빛 </a:t>
+              <a:t> </a:t>
             </a:r>
             <a:r>
               <a:rPr lang="en-US" altLang="ko-KR" dirty="0">
@@ -4329,6 +4336,13 @@
           </a:p>
           <a:p>
             <a:pPr algn="r"/>
+            <a:r>
+              <a:rPr lang="en-US" altLang="ko-KR" dirty="0">
+                <a:latin typeface="a천생연분" panose="02020600000000000000" pitchFamily="18" charset="-127"/>
+                <a:ea typeface="a천생연분" panose="02020600000000000000" pitchFamily="18" charset="-127"/>
+              </a:rPr>
+              <a:t>Presenter) </a:t>
+            </a:r>
             <a:r>
               <a:rPr lang="ko-KR" altLang="en-US" dirty="0">
                 <a:latin typeface="a천생연분" panose="02020600000000000000" pitchFamily="18" charset="-127"/>

</xml_diff>